<commit_message>
Añadi infograma version full
</commit_message>
<xml_diff>
--- a/diseño/Queue.pptx
+++ b/diseño/Queue.pptx
@@ -16,10 +16,12 @@
     <p:sldId id="281" r:id="rId10"/>
     <p:sldId id="282" r:id="rId11"/>
     <p:sldId id="271" r:id="rId12"/>
-    <p:sldId id="277" r:id="rId13"/>
-    <p:sldId id="279" r:id="rId14"/>
-    <p:sldId id="283" r:id="rId15"/>
-    <p:sldId id="268" r:id="rId16"/>
+    <p:sldId id="285" r:id="rId13"/>
+    <p:sldId id="277" r:id="rId14"/>
+    <p:sldId id="279" r:id="rId15"/>
+    <p:sldId id="286" r:id="rId16"/>
+    <p:sldId id="287" r:id="rId17"/>
+    <p:sldId id="268" r:id="rId18"/>
   </p:sldIdLst>
   <p:sldSz cx="12192000" cy="6858000"/>
   <p:notesSz cx="6858000" cy="9144000"/>
@@ -4408,45 +4410,6 @@
           </a:p>
         </p:txBody>
       </p:sp>
-      <p:sp>
-        <p:nvSpPr>
-          <p:cNvPr id="2" name="TextBox 1">
-            <a:extLst>
-              <a:ext uri="{FF2B5EF4-FFF2-40B4-BE49-F238E27FC236}">
-                <a16:creationId xmlns:a16="http://schemas.microsoft.com/office/drawing/2014/main" id="{3BB011FA-2DB8-A449-BC6D-68EA56CC8B46}"/>
-              </a:ext>
-            </a:extLst>
-          </p:cNvPr>
-          <p:cNvSpPr txBox="1"/>
-          <p:nvPr/>
-        </p:nvSpPr>
-        <p:spPr>
-          <a:xfrm>
-            <a:off x="1714501" y="3457833"/>
-            <a:ext cx="3023264" cy="769441"/>
-          </a:xfrm>
-          <a:prstGeom prst="rect">
-            <a:avLst/>
-          </a:prstGeom>
-          <a:noFill/>
-        </p:spPr>
-        <p:txBody>
-          <a:bodyPr wrap="none" rtlCol="0">
-            <a:spAutoFit/>
-          </a:bodyPr>
-          <a:lstStyle/>
-          <a:p>
-            <a:r>
-              <a:rPr lang="es-ES_tradnl" sz="4400" dirty="0">
-                <a:solidFill>
-                  <a:schemeClr val="bg1"/>
-                </a:solidFill>
-              </a:rPr>
-              <a:t>Y continua…</a:t>
-            </a:r>
-          </a:p>
-        </p:txBody>
-      </p:sp>
       <p:grpSp>
         <p:nvGrpSpPr>
           <p:cNvPr id="8" name="Group 7">
@@ -4730,6 +4693,125 @@
           </p:txBody>
         </p:sp>
       </p:grpSp>
+      <p:sp>
+        <p:nvSpPr>
+          <p:cNvPr id="3" name="Rectangle 2">
+            <a:extLst>
+              <a:ext uri="{FF2B5EF4-FFF2-40B4-BE49-F238E27FC236}">
+                <a16:creationId xmlns:a16="http://schemas.microsoft.com/office/drawing/2014/main" id="{EDDA3E45-A7DB-2841-96FB-8A05943D2918}"/>
+              </a:ext>
+            </a:extLst>
+          </p:cNvPr>
+          <p:cNvSpPr/>
+          <p:nvPr/>
+        </p:nvSpPr>
+        <p:spPr>
+          <a:xfrm>
+            <a:off x="2042160" y="1871826"/>
+            <a:ext cx="8107680" cy="3114347"/>
+          </a:xfrm>
+          <a:prstGeom prst="rect">
+            <a:avLst/>
+          </a:prstGeom>
+        </p:spPr>
+        <p:style>
+          <a:lnRef idx="2">
+            <a:schemeClr val="accent1">
+              <a:shade val="50000"/>
+            </a:schemeClr>
+          </a:lnRef>
+          <a:fillRef idx="1">
+            <a:schemeClr val="accent1"/>
+          </a:fillRef>
+          <a:effectRef idx="0">
+            <a:schemeClr val="accent1"/>
+          </a:effectRef>
+          <a:fontRef idx="minor">
+            <a:schemeClr val="lt1"/>
+          </a:fontRef>
+        </p:style>
+        <p:txBody>
+          <a:bodyPr rtlCol="0" anchor="ctr"/>
+          <a:lstStyle/>
+          <a:p>
+            <a:pPr algn="ctr"/>
+            <a:r>
+              <a:rPr lang="es-ES_tradnl" dirty="0" err="1"/>
+              <a:t>Graficos</a:t>
+            </a:r>
+            <a:r>
+              <a:rPr lang="es-ES_tradnl" dirty="0"/>
+              <a:t> </a:t>
+            </a:r>
+            <a:r>
+              <a:rPr lang="es-ES_tradnl" dirty="0" err="1"/>
+              <a:t>pulentos</a:t>
+            </a:r>
+            <a:endParaRPr lang="es-ES_tradnl" dirty="0"/>
+          </a:p>
+        </p:txBody>
+      </p:sp>
+      <p:sp>
+        <p:nvSpPr>
+          <p:cNvPr id="15" name="Rectangle 14">
+            <a:extLst>
+              <a:ext uri="{FF2B5EF4-FFF2-40B4-BE49-F238E27FC236}">
+                <a16:creationId xmlns:a16="http://schemas.microsoft.com/office/drawing/2014/main" id="{297EF101-6CF1-914D-8C1A-F8ABB8F01D3B}"/>
+              </a:ext>
+            </a:extLst>
+          </p:cNvPr>
+          <p:cNvSpPr/>
+          <p:nvPr/>
+        </p:nvSpPr>
+        <p:spPr>
+          <a:xfrm>
+            <a:off x="5126156" y="5824961"/>
+            <a:ext cx="1939687" cy="651236"/>
+          </a:xfrm>
+          <a:prstGeom prst="rect">
+            <a:avLst/>
+          </a:prstGeom>
+          <a:solidFill>
+            <a:srgbClr val="785D9E"/>
+          </a:solidFill>
+          <a:ln w="127000" cap="rnd">
+            <a:solidFill>
+              <a:srgbClr val="785D9E"/>
+            </a:solidFill>
+            <a:round/>
+          </a:ln>
+        </p:spPr>
+        <p:style>
+          <a:lnRef idx="2">
+            <a:schemeClr val="accent1">
+              <a:shade val="50000"/>
+            </a:schemeClr>
+          </a:lnRef>
+          <a:fillRef idx="1">
+            <a:schemeClr val="accent1"/>
+          </a:fillRef>
+          <a:effectRef idx="0">
+            <a:schemeClr val="accent1"/>
+          </a:effectRef>
+          <a:fontRef idx="minor">
+            <a:schemeClr val="lt1"/>
+          </a:fontRef>
+        </p:style>
+        <p:txBody>
+          <a:bodyPr rtlCol="0" anchor="ctr"/>
+          <a:lstStyle/>
+          <a:p>
+            <a:pPr algn="ctr"/>
+            <a:r>
+              <a:rPr lang="es-ES_tradnl" sz="2400" b="1" dirty="0">
+                <a:latin typeface="Roboto" panose="02000000000000000000" pitchFamily="2" charset="0"/>
+                <a:ea typeface="Roboto" panose="02000000000000000000" pitchFamily="2" charset="0"/>
+              </a:rPr>
+              <a:t>Ver más</a:t>
+            </a:r>
+          </a:p>
+        </p:txBody>
+      </p:sp>
     </p:spTree>
     <p:extLst>
       <p:ext uri="{BB962C8B-B14F-4D97-AF65-F5344CB8AC3E}">
@@ -4747,6 +4829,718 @@
 </file>
 
 <file path=ppt/slides/slide12.xml><?xml version="1.0" encoding="utf-8"?>
+<p:sld xmlns:a="http://schemas.openxmlformats.org/drawingml/2006/main" xmlns:r="http://schemas.openxmlformats.org/officeDocument/2006/relationships" xmlns:p="http://schemas.openxmlformats.org/presentationml/2006/main">
+  <p:cSld>
+    <p:bg>
+      <p:bgPr>
+        <a:solidFill>
+          <a:srgbClr val="6B4377"/>
+        </a:solidFill>
+        <a:effectLst/>
+      </p:bgPr>
+    </p:bg>
+    <p:spTree>
+      <p:nvGrpSpPr>
+        <p:cNvPr id="1" name=""/>
+        <p:cNvGrpSpPr/>
+        <p:nvPr/>
+      </p:nvGrpSpPr>
+      <p:grpSpPr>
+        <a:xfrm>
+          <a:off x="0" y="0"/>
+          <a:ext cx="0" cy="0"/>
+          <a:chOff x="0" y="0"/>
+          <a:chExt cx="0" cy="0"/>
+        </a:xfrm>
+      </p:grpSpPr>
+      <p:grpSp>
+        <p:nvGrpSpPr>
+          <p:cNvPr id="8" name="Group 7">
+            <a:extLst>
+              <a:ext uri="{FF2B5EF4-FFF2-40B4-BE49-F238E27FC236}">
+                <a16:creationId xmlns:a16="http://schemas.microsoft.com/office/drawing/2014/main" id="{23E1AAA3-9611-744B-8165-BA4EE5F6FAF9}"/>
+              </a:ext>
+            </a:extLst>
+          </p:cNvPr>
+          <p:cNvGrpSpPr/>
+          <p:nvPr/>
+        </p:nvGrpSpPr>
+        <p:grpSpPr>
+          <a:xfrm>
+            <a:off x="11595394" y="2278155"/>
+            <a:ext cx="296562" cy="2330266"/>
+            <a:chOff x="11310096" y="2644346"/>
+            <a:chExt cx="296562" cy="2330266"/>
+          </a:xfrm>
+        </p:grpSpPr>
+        <p:sp>
+          <p:nvSpPr>
+            <p:cNvPr id="9" name="Oval 8">
+              <a:extLst>
+                <a:ext uri="{FF2B5EF4-FFF2-40B4-BE49-F238E27FC236}">
+                  <a16:creationId xmlns:a16="http://schemas.microsoft.com/office/drawing/2014/main" id="{ED93E88C-89B9-104C-A6F5-B4DB868D3EE3}"/>
+                </a:ext>
+              </a:extLst>
+            </p:cNvPr>
+            <p:cNvSpPr/>
+            <p:nvPr/>
+          </p:nvSpPr>
+          <p:spPr>
+            <a:xfrm>
+              <a:off x="11310096" y="2644346"/>
+              <a:ext cx="296562" cy="296562"/>
+            </a:xfrm>
+            <a:prstGeom prst="ellipse">
+              <a:avLst/>
+            </a:prstGeom>
+            <a:noFill/>
+            <a:ln w="63500">
+              <a:solidFill>
+                <a:schemeClr val="bg1"/>
+              </a:solidFill>
+            </a:ln>
+          </p:spPr>
+          <p:style>
+            <a:lnRef idx="2">
+              <a:schemeClr val="accent1">
+                <a:shade val="50000"/>
+              </a:schemeClr>
+            </a:lnRef>
+            <a:fillRef idx="1">
+              <a:schemeClr val="accent1"/>
+            </a:fillRef>
+            <a:effectRef idx="0">
+              <a:schemeClr val="accent1"/>
+            </a:effectRef>
+            <a:fontRef idx="minor">
+              <a:schemeClr val="lt1"/>
+            </a:fontRef>
+          </p:style>
+          <p:txBody>
+            <a:bodyPr rtlCol="0" anchor="ctr"/>
+            <a:lstStyle/>
+            <a:p>
+              <a:pPr algn="ctr"/>
+              <a:endParaRPr lang="es-ES_tradnl"/>
+            </a:p>
+          </p:txBody>
+        </p:sp>
+        <p:sp>
+          <p:nvSpPr>
+            <p:cNvPr id="10" name="Oval 9">
+              <a:extLst>
+                <a:ext uri="{FF2B5EF4-FFF2-40B4-BE49-F238E27FC236}">
+                  <a16:creationId xmlns:a16="http://schemas.microsoft.com/office/drawing/2014/main" id="{1898CB3D-C375-CB44-9D77-23EC73B8336D}"/>
+                </a:ext>
+              </a:extLst>
+            </p:cNvPr>
+            <p:cNvSpPr/>
+            <p:nvPr/>
+          </p:nvSpPr>
+          <p:spPr>
+            <a:xfrm>
+              <a:off x="11310096" y="3152772"/>
+              <a:ext cx="296562" cy="296562"/>
+            </a:xfrm>
+            <a:prstGeom prst="ellipse">
+              <a:avLst/>
+            </a:prstGeom>
+            <a:noFill/>
+            <a:ln w="63500">
+              <a:solidFill>
+                <a:schemeClr val="bg1"/>
+              </a:solidFill>
+            </a:ln>
+          </p:spPr>
+          <p:style>
+            <a:lnRef idx="2">
+              <a:schemeClr val="accent1">
+                <a:shade val="50000"/>
+              </a:schemeClr>
+            </a:lnRef>
+            <a:fillRef idx="1">
+              <a:schemeClr val="accent1"/>
+            </a:fillRef>
+            <a:effectRef idx="0">
+              <a:schemeClr val="accent1"/>
+            </a:effectRef>
+            <a:fontRef idx="minor">
+              <a:schemeClr val="lt1"/>
+            </a:fontRef>
+          </p:style>
+          <p:txBody>
+            <a:bodyPr rtlCol="0" anchor="ctr"/>
+            <a:lstStyle/>
+            <a:p>
+              <a:pPr algn="ctr"/>
+              <a:endParaRPr lang="es-ES_tradnl"/>
+            </a:p>
+          </p:txBody>
+        </p:sp>
+        <p:sp>
+          <p:nvSpPr>
+            <p:cNvPr id="12" name="Oval 11">
+              <a:extLst>
+                <a:ext uri="{FF2B5EF4-FFF2-40B4-BE49-F238E27FC236}">
+                  <a16:creationId xmlns:a16="http://schemas.microsoft.com/office/drawing/2014/main" id="{09D2BB50-51B5-3C45-8ECD-77EB390E90D2}"/>
+                </a:ext>
+              </a:extLst>
+            </p:cNvPr>
+            <p:cNvSpPr/>
+            <p:nvPr/>
+          </p:nvSpPr>
+          <p:spPr>
+            <a:xfrm>
+              <a:off x="11310096" y="3661198"/>
+              <a:ext cx="296562" cy="296562"/>
+            </a:xfrm>
+            <a:prstGeom prst="ellipse">
+              <a:avLst/>
+            </a:prstGeom>
+            <a:noFill/>
+            <a:ln w="63500">
+              <a:solidFill>
+                <a:schemeClr val="bg1"/>
+              </a:solidFill>
+            </a:ln>
+          </p:spPr>
+          <p:style>
+            <a:lnRef idx="2">
+              <a:schemeClr val="accent1">
+                <a:shade val="50000"/>
+              </a:schemeClr>
+            </a:lnRef>
+            <a:fillRef idx="1">
+              <a:schemeClr val="accent1"/>
+            </a:fillRef>
+            <a:effectRef idx="0">
+              <a:schemeClr val="accent1"/>
+            </a:effectRef>
+            <a:fontRef idx="minor">
+              <a:schemeClr val="lt1"/>
+            </a:fontRef>
+          </p:style>
+          <p:txBody>
+            <a:bodyPr rtlCol="0" anchor="ctr"/>
+            <a:lstStyle/>
+            <a:p>
+              <a:pPr algn="ctr"/>
+              <a:endParaRPr lang="es-ES_tradnl"/>
+            </a:p>
+          </p:txBody>
+        </p:sp>
+        <p:sp>
+          <p:nvSpPr>
+            <p:cNvPr id="13" name="Oval 12">
+              <a:extLst>
+                <a:ext uri="{FF2B5EF4-FFF2-40B4-BE49-F238E27FC236}">
+                  <a16:creationId xmlns:a16="http://schemas.microsoft.com/office/drawing/2014/main" id="{376B9D10-0A9F-2D42-8CCA-337A568EC021}"/>
+                </a:ext>
+              </a:extLst>
+            </p:cNvPr>
+            <p:cNvSpPr/>
+            <p:nvPr/>
+          </p:nvSpPr>
+          <p:spPr>
+            <a:xfrm>
+              <a:off x="11310096" y="4169624"/>
+              <a:ext cx="296562" cy="296562"/>
+            </a:xfrm>
+            <a:prstGeom prst="ellipse">
+              <a:avLst/>
+            </a:prstGeom>
+            <a:solidFill>
+              <a:schemeClr val="bg1"/>
+            </a:solidFill>
+            <a:ln w="63500">
+              <a:solidFill>
+                <a:schemeClr val="bg1"/>
+              </a:solidFill>
+            </a:ln>
+          </p:spPr>
+          <p:style>
+            <a:lnRef idx="2">
+              <a:schemeClr val="accent1">
+                <a:shade val="50000"/>
+              </a:schemeClr>
+            </a:lnRef>
+            <a:fillRef idx="1">
+              <a:schemeClr val="accent1"/>
+            </a:fillRef>
+            <a:effectRef idx="0">
+              <a:schemeClr val="accent1"/>
+            </a:effectRef>
+            <a:fontRef idx="minor">
+              <a:schemeClr val="lt1"/>
+            </a:fontRef>
+          </p:style>
+          <p:txBody>
+            <a:bodyPr rtlCol="0" anchor="ctr"/>
+            <a:lstStyle/>
+            <a:p>
+              <a:pPr algn="ctr"/>
+              <a:endParaRPr lang="es-ES_tradnl"/>
+            </a:p>
+          </p:txBody>
+        </p:sp>
+        <p:sp>
+          <p:nvSpPr>
+            <p:cNvPr id="14" name="Oval 13">
+              <a:extLst>
+                <a:ext uri="{FF2B5EF4-FFF2-40B4-BE49-F238E27FC236}">
+                  <a16:creationId xmlns:a16="http://schemas.microsoft.com/office/drawing/2014/main" id="{552A2E91-B6C2-AC4E-8A55-7E1E2E65F43A}"/>
+                </a:ext>
+              </a:extLst>
+            </p:cNvPr>
+            <p:cNvSpPr/>
+            <p:nvPr/>
+          </p:nvSpPr>
+          <p:spPr>
+            <a:xfrm>
+              <a:off x="11310096" y="4678050"/>
+              <a:ext cx="296562" cy="296562"/>
+            </a:xfrm>
+            <a:prstGeom prst="ellipse">
+              <a:avLst/>
+            </a:prstGeom>
+            <a:noFill/>
+            <a:ln w="63500">
+              <a:solidFill>
+                <a:schemeClr val="bg1"/>
+              </a:solidFill>
+            </a:ln>
+          </p:spPr>
+          <p:style>
+            <a:lnRef idx="2">
+              <a:schemeClr val="accent1">
+                <a:shade val="50000"/>
+              </a:schemeClr>
+            </a:lnRef>
+            <a:fillRef idx="1">
+              <a:schemeClr val="accent1"/>
+            </a:fillRef>
+            <a:effectRef idx="0">
+              <a:schemeClr val="accent1"/>
+            </a:effectRef>
+            <a:fontRef idx="minor">
+              <a:schemeClr val="lt1"/>
+            </a:fontRef>
+          </p:style>
+          <p:txBody>
+            <a:bodyPr rtlCol="0" anchor="ctr"/>
+            <a:lstStyle/>
+            <a:p>
+              <a:pPr algn="ctr"/>
+              <a:endParaRPr lang="es-ES_tradnl"/>
+            </a:p>
+          </p:txBody>
+        </p:sp>
+      </p:grpSp>
+      <p:sp>
+        <p:nvSpPr>
+          <p:cNvPr id="16" name="TextBox 15">
+            <a:extLst>
+              <a:ext uri="{FF2B5EF4-FFF2-40B4-BE49-F238E27FC236}">
+                <a16:creationId xmlns:a16="http://schemas.microsoft.com/office/drawing/2014/main" id="{14F79C51-956F-3E48-B354-35B8DEC1B217}"/>
+              </a:ext>
+            </a:extLst>
+          </p:cNvPr>
+          <p:cNvSpPr txBox="1"/>
+          <p:nvPr/>
+        </p:nvSpPr>
+        <p:spPr>
+          <a:xfrm>
+            <a:off x="1060730" y="4725998"/>
+            <a:ext cx="9984456" cy="892552"/>
+          </a:xfrm>
+          <a:prstGeom prst="rect">
+            <a:avLst/>
+          </a:prstGeom>
+          <a:noFill/>
+        </p:spPr>
+        <p:txBody>
+          <a:bodyPr wrap="square" rtlCol="0">
+            <a:spAutoFit/>
+          </a:bodyPr>
+          <a:lstStyle/>
+          <a:p>
+            <a:r>
+              <a:rPr lang="es-ES_tradnl" sz="3000" b="1" dirty="0">
+                <a:solidFill>
+                  <a:prstClr val="white"/>
+                </a:solidFill>
+                <a:latin typeface="Roboto" panose="02000000000000000000" pitchFamily="2" charset="0"/>
+                <a:ea typeface="Roboto" panose="02000000000000000000" pitchFamily="2" charset="0"/>
+              </a:rPr>
+              <a:t>+ Optimización</a:t>
+            </a:r>
+          </a:p>
+          <a:p>
+            <a:r>
+              <a:rPr lang="es-ES_tradnl" sz="2200" dirty="0">
+                <a:solidFill>
+                  <a:schemeClr val="bg1"/>
+                </a:solidFill>
+                <a:latin typeface="Roboto" panose="02000000000000000000" pitchFamily="2" charset="0"/>
+                <a:ea typeface="Roboto" panose="02000000000000000000" pitchFamily="2" charset="0"/>
+              </a:rPr>
+              <a:t>Calculamos la dotación que necesitas para cumplir con tus metas</a:t>
+            </a:r>
+            <a:endParaRPr lang="es-ES_tradnl" sz="2200" b="1" dirty="0">
+              <a:solidFill>
+                <a:schemeClr val="bg1"/>
+              </a:solidFill>
+              <a:latin typeface="Roboto" panose="02000000000000000000" pitchFamily="2" charset="0"/>
+              <a:ea typeface="Roboto" panose="02000000000000000000" pitchFamily="2" charset="0"/>
+            </a:endParaRPr>
+          </a:p>
+        </p:txBody>
+      </p:sp>
+      <p:sp>
+        <p:nvSpPr>
+          <p:cNvPr id="17" name="Rectangle 16">
+            <a:extLst>
+              <a:ext uri="{FF2B5EF4-FFF2-40B4-BE49-F238E27FC236}">
+                <a16:creationId xmlns:a16="http://schemas.microsoft.com/office/drawing/2014/main" id="{150C2A8F-C66D-DE4C-B3A6-CD8130036CF8}"/>
+              </a:ext>
+            </a:extLst>
+          </p:cNvPr>
+          <p:cNvSpPr/>
+          <p:nvPr/>
+        </p:nvSpPr>
+        <p:spPr>
+          <a:xfrm>
+            <a:off x="5126156" y="5824961"/>
+            <a:ext cx="1939687" cy="651236"/>
+          </a:xfrm>
+          <a:prstGeom prst="rect">
+            <a:avLst/>
+          </a:prstGeom>
+          <a:solidFill>
+            <a:srgbClr val="785D9E"/>
+          </a:solidFill>
+          <a:ln w="127000" cap="rnd">
+            <a:solidFill>
+              <a:srgbClr val="785D9E"/>
+            </a:solidFill>
+            <a:round/>
+          </a:ln>
+        </p:spPr>
+        <p:style>
+          <a:lnRef idx="2">
+            <a:schemeClr val="accent1">
+              <a:shade val="50000"/>
+            </a:schemeClr>
+          </a:lnRef>
+          <a:fillRef idx="1">
+            <a:schemeClr val="accent1"/>
+          </a:fillRef>
+          <a:effectRef idx="0">
+            <a:schemeClr val="accent1"/>
+          </a:effectRef>
+          <a:fontRef idx="minor">
+            <a:schemeClr val="lt1"/>
+          </a:fontRef>
+        </p:style>
+        <p:txBody>
+          <a:bodyPr rtlCol="0" anchor="ctr"/>
+          <a:lstStyle/>
+          <a:p>
+            <a:pPr algn="ctr"/>
+            <a:r>
+              <a:rPr lang="es-ES_tradnl" sz="2400" b="1" dirty="0">
+                <a:latin typeface="Roboto" panose="02000000000000000000" pitchFamily="2" charset="0"/>
+                <a:ea typeface="Roboto" panose="02000000000000000000" pitchFamily="2" charset="0"/>
+              </a:rPr>
+              <a:t>Contáctanos</a:t>
+            </a:r>
+          </a:p>
+        </p:txBody>
+      </p:sp>
+      <p:sp>
+        <p:nvSpPr>
+          <p:cNvPr id="3" name="Rectangle 2">
+            <a:extLst>
+              <a:ext uri="{FF2B5EF4-FFF2-40B4-BE49-F238E27FC236}">
+                <a16:creationId xmlns:a16="http://schemas.microsoft.com/office/drawing/2014/main" id="{FAA9858B-D1A4-3A49-BE3D-229B6292F0D6}"/>
+              </a:ext>
+            </a:extLst>
+          </p:cNvPr>
+          <p:cNvSpPr/>
+          <p:nvPr/>
+        </p:nvSpPr>
+        <p:spPr>
+          <a:xfrm>
+            <a:off x="1103772" y="2072681"/>
+            <a:ext cx="9661764" cy="892552"/>
+          </a:xfrm>
+          <a:prstGeom prst="rect">
+            <a:avLst/>
+          </a:prstGeom>
+        </p:spPr>
+        <p:txBody>
+          <a:bodyPr wrap="square">
+            <a:spAutoFit/>
+          </a:bodyPr>
+          <a:lstStyle/>
+          <a:p>
+            <a:pPr lvl="0"/>
+            <a:r>
+              <a:rPr lang="es-ES_tradnl" sz="3000" b="1" dirty="0">
+                <a:solidFill>
+                  <a:prstClr val="white"/>
+                </a:solidFill>
+                <a:latin typeface="Roboto" panose="02000000000000000000" pitchFamily="2" charset="0"/>
+                <a:ea typeface="Roboto" panose="02000000000000000000" pitchFamily="2" charset="0"/>
+              </a:rPr>
+              <a:t>+ Escala</a:t>
+            </a:r>
+          </a:p>
+          <a:p>
+            <a:pPr lvl="0"/>
+            <a:r>
+              <a:rPr lang="es-ES_tradnl" sz="2200" dirty="0">
+                <a:solidFill>
+                  <a:prstClr val="white"/>
+                </a:solidFill>
+                <a:latin typeface="Roboto" panose="02000000000000000000" pitchFamily="2" charset="0"/>
+                <a:ea typeface="Roboto" panose="02000000000000000000" pitchFamily="2" charset="0"/>
+              </a:rPr>
+              <a:t>Simula locales completos y pools de cajas (por ejemplo, cajas autoservicio).</a:t>
+            </a:r>
+            <a:endParaRPr lang="es-ES_tradnl" sz="2200" b="1" dirty="0">
+              <a:solidFill>
+                <a:prstClr val="white"/>
+              </a:solidFill>
+              <a:latin typeface="Roboto" panose="02000000000000000000" pitchFamily="2" charset="0"/>
+              <a:ea typeface="Roboto" panose="02000000000000000000" pitchFamily="2" charset="0"/>
+            </a:endParaRPr>
+          </a:p>
+        </p:txBody>
+      </p:sp>
+      <p:sp>
+        <p:nvSpPr>
+          <p:cNvPr id="4" name="Rectangle 3">
+            <a:extLst>
+              <a:ext uri="{FF2B5EF4-FFF2-40B4-BE49-F238E27FC236}">
+                <a16:creationId xmlns:a16="http://schemas.microsoft.com/office/drawing/2014/main" id="{E6E65D7B-EDFF-FE42-9CF4-5888A80F72B4}"/>
+              </a:ext>
+            </a:extLst>
+          </p:cNvPr>
+          <p:cNvSpPr/>
+          <p:nvPr/>
+        </p:nvSpPr>
+        <p:spPr>
+          <a:xfrm>
+            <a:off x="1103772" y="2956963"/>
+            <a:ext cx="9570720" cy="892552"/>
+          </a:xfrm>
+          <a:prstGeom prst="rect">
+            <a:avLst/>
+          </a:prstGeom>
+        </p:spPr>
+        <p:txBody>
+          <a:bodyPr wrap="square">
+            <a:spAutoFit/>
+          </a:bodyPr>
+          <a:lstStyle/>
+          <a:p>
+            <a:pPr lvl="0"/>
+            <a:r>
+              <a:rPr lang="es-ES_tradnl" sz="3000" b="1" dirty="0">
+                <a:solidFill>
+                  <a:prstClr val="white"/>
+                </a:solidFill>
+                <a:latin typeface="Roboto" panose="02000000000000000000" pitchFamily="2" charset="0"/>
+                <a:ea typeface="Roboto" panose="02000000000000000000" pitchFamily="2" charset="0"/>
+              </a:rPr>
+              <a:t>+ Horizonte</a:t>
+            </a:r>
+          </a:p>
+          <a:p>
+            <a:pPr lvl="0"/>
+            <a:r>
+              <a:rPr lang="es-ES_tradnl" sz="2200" dirty="0">
+                <a:solidFill>
+                  <a:prstClr val="white"/>
+                </a:solidFill>
+                <a:latin typeface="Roboto" panose="02000000000000000000" pitchFamily="2" charset="0"/>
+                <a:ea typeface="Roboto" panose="02000000000000000000" pitchFamily="2" charset="0"/>
+              </a:rPr>
+              <a:t>Simula semanas y meses completos.</a:t>
+            </a:r>
+          </a:p>
+        </p:txBody>
+      </p:sp>
+      <p:sp>
+        <p:nvSpPr>
+          <p:cNvPr id="5" name="Rectangle 4">
+            <a:extLst>
+              <a:ext uri="{FF2B5EF4-FFF2-40B4-BE49-F238E27FC236}">
+                <a16:creationId xmlns:a16="http://schemas.microsoft.com/office/drawing/2014/main" id="{EEA77F8E-FECD-304A-9A5D-463F7D4B9F1D}"/>
+              </a:ext>
+            </a:extLst>
+          </p:cNvPr>
+          <p:cNvSpPr/>
+          <p:nvPr/>
+        </p:nvSpPr>
+        <p:spPr>
+          <a:xfrm>
+            <a:off x="1060730" y="3865583"/>
+            <a:ext cx="9704806" cy="892552"/>
+          </a:xfrm>
+          <a:prstGeom prst="rect">
+            <a:avLst/>
+          </a:prstGeom>
+        </p:spPr>
+        <p:txBody>
+          <a:bodyPr wrap="square">
+            <a:spAutoFit/>
+          </a:bodyPr>
+          <a:lstStyle/>
+          <a:p>
+            <a:pPr lvl="0"/>
+            <a:r>
+              <a:rPr lang="es-ES_tradnl" sz="3000" b="1" dirty="0">
+                <a:solidFill>
+                  <a:prstClr val="white"/>
+                </a:solidFill>
+                <a:latin typeface="Roboto" panose="02000000000000000000" pitchFamily="2" charset="0"/>
+                <a:ea typeface="Roboto" panose="02000000000000000000" pitchFamily="2" charset="0"/>
+              </a:rPr>
+              <a:t>+ Precisión </a:t>
+            </a:r>
+          </a:p>
+          <a:p>
+            <a:pPr lvl="0"/>
+            <a:r>
+              <a:rPr lang="es-ES_tradnl" sz="2200" dirty="0">
+                <a:solidFill>
+                  <a:prstClr val="white"/>
+                </a:solidFill>
+                <a:latin typeface="Roboto" panose="02000000000000000000" pitchFamily="2" charset="0"/>
+                <a:ea typeface="Roboto" panose="02000000000000000000" pitchFamily="2" charset="0"/>
+              </a:rPr>
+              <a:t>Ajustamos la simulación a tus datos para que sea esta sea más realista.</a:t>
+            </a:r>
+          </a:p>
+        </p:txBody>
+      </p:sp>
+      <p:sp>
+        <p:nvSpPr>
+          <p:cNvPr id="18" name="TextBox 17">
+            <a:extLst>
+              <a:ext uri="{FF2B5EF4-FFF2-40B4-BE49-F238E27FC236}">
+                <a16:creationId xmlns:a16="http://schemas.microsoft.com/office/drawing/2014/main" id="{F6180F72-A993-F74D-A629-F3EE30CADB7E}"/>
+              </a:ext>
+            </a:extLst>
+          </p:cNvPr>
+          <p:cNvSpPr txBox="1"/>
+          <p:nvPr/>
+        </p:nvSpPr>
+        <p:spPr>
+          <a:xfrm>
+            <a:off x="506628" y="347325"/>
+            <a:ext cx="11108724" cy="1015663"/>
+          </a:xfrm>
+          <a:prstGeom prst="rect">
+            <a:avLst/>
+          </a:prstGeom>
+          <a:noFill/>
+        </p:spPr>
+        <p:txBody>
+          <a:bodyPr wrap="square" rtlCol="0">
+            <a:spAutoFit/>
+          </a:bodyPr>
+          <a:lstStyle/>
+          <a:p>
+            <a:pPr algn="ctr"/>
+            <a:r>
+              <a:rPr lang="es-ES_tradnl" sz="6000" dirty="0">
+                <a:solidFill>
+                  <a:schemeClr val="bg1"/>
+                </a:solidFill>
+                <a:latin typeface="Roboto" panose="02000000000000000000" pitchFamily="2" charset="0"/>
+                <a:ea typeface="Roboto" panose="02000000000000000000" pitchFamily="2" charset="0"/>
+              </a:rPr>
+              <a:t>pruébame</a:t>
+            </a:r>
+            <a:endParaRPr lang="es-ES_tradnl" sz="6000" b="1" dirty="0">
+              <a:solidFill>
+                <a:schemeClr val="bg1"/>
+              </a:solidFill>
+              <a:latin typeface="Roboto" panose="02000000000000000000" pitchFamily="2" charset="0"/>
+              <a:ea typeface="Roboto" panose="02000000000000000000" pitchFamily="2" charset="0"/>
+            </a:endParaRPr>
+          </a:p>
+        </p:txBody>
+      </p:sp>
+      <p:sp>
+        <p:nvSpPr>
+          <p:cNvPr id="19" name="TextBox 18">
+            <a:extLst>
+              <a:ext uri="{FF2B5EF4-FFF2-40B4-BE49-F238E27FC236}">
+                <a16:creationId xmlns:a16="http://schemas.microsoft.com/office/drawing/2014/main" id="{7A2C6C20-737D-BD40-AB83-E42A8288CB6C}"/>
+              </a:ext>
+            </a:extLst>
+          </p:cNvPr>
+          <p:cNvSpPr txBox="1"/>
+          <p:nvPr/>
+        </p:nvSpPr>
+        <p:spPr>
+          <a:xfrm>
+            <a:off x="2865884" y="1554668"/>
+            <a:ext cx="6460230" cy="477054"/>
+          </a:xfrm>
+          <a:prstGeom prst="rect">
+            <a:avLst/>
+          </a:prstGeom>
+          <a:noFill/>
+        </p:spPr>
+        <p:txBody>
+          <a:bodyPr wrap="square" rtlCol="0">
+            <a:spAutoFit/>
+          </a:bodyPr>
+          <a:lstStyle/>
+          <a:p>
+            <a:pPr algn="ctr"/>
+            <a:r>
+              <a:rPr lang="es-ES_tradnl" sz="2500" b="1" dirty="0">
+                <a:solidFill>
+                  <a:schemeClr val="bg1"/>
+                </a:solidFill>
+                <a:latin typeface="Roboto" panose="02000000000000000000" pitchFamily="2" charset="0"/>
+                <a:ea typeface="Roboto" panose="02000000000000000000" pitchFamily="2" charset="0"/>
+              </a:rPr>
+              <a:t>Con la versión completa podrás:</a:t>
+            </a:r>
+            <a:endParaRPr lang="es-ES_tradnl" sz="2400" dirty="0">
+              <a:solidFill>
+                <a:schemeClr val="bg1"/>
+              </a:solidFill>
+              <a:latin typeface="Roboto" panose="02000000000000000000" pitchFamily="2" charset="0"/>
+              <a:ea typeface="Roboto" panose="02000000000000000000" pitchFamily="2" charset="0"/>
+            </a:endParaRPr>
+          </a:p>
+        </p:txBody>
+      </p:sp>
+    </p:spTree>
+    <p:extLst>
+      <p:ext uri="{BB962C8B-B14F-4D97-AF65-F5344CB8AC3E}">
+        <p14:creationId xmlns:p14="http://schemas.microsoft.com/office/powerpoint/2010/main" val="2657836325"/>
+      </p:ext>
+    </p:extLst>
+  </p:cSld>
+  <p:clrMapOvr>
+    <a:masterClrMapping/>
+  </p:clrMapOvr>
+  <p:transition spd="slow">
+    <p:push dir="u"/>
+  </p:transition>
+</p:sld>
+</file>
+
+<file path=ppt/slides/slide13.xml><?xml version="1.0" encoding="utf-8"?>
 <p:sld xmlns:a="http://schemas.openxmlformats.org/drawingml/2006/main" xmlns:r="http://schemas.openxmlformats.org/officeDocument/2006/relationships" xmlns:p="http://schemas.openxmlformats.org/presentationml/2006/main">
   <p:cSld>
     <p:bg>
@@ -5412,7 +6206,7 @@
 </p:sld>
 </file>
 
-<file path=ppt/slides/slide13.xml><?xml version="1.0" encoding="utf-8"?>
+<file path=ppt/slides/slide14.xml><?xml version="1.0" encoding="utf-8"?>
 <p:sld xmlns:a="http://schemas.openxmlformats.org/drawingml/2006/main" xmlns:r="http://schemas.openxmlformats.org/officeDocument/2006/relationships" xmlns:p="http://schemas.openxmlformats.org/presentationml/2006/main">
   <p:cSld>
     <p:bg>
@@ -6185,7 +6979,7 @@
 </p:sld>
 </file>
 
-<file path=ppt/slides/slide14.xml><?xml version="1.0" encoding="utf-8"?>
+<file path=ppt/slides/slide15.xml><?xml version="1.0" encoding="utf-8"?>
 <p:sld xmlns:a="http://schemas.openxmlformats.org/drawingml/2006/main" xmlns:r="http://schemas.openxmlformats.org/officeDocument/2006/relationships" xmlns:p="http://schemas.openxmlformats.org/presentationml/2006/main">
   <p:cSld>
     <p:bg>
@@ -6255,58 +7049,6 @@
               </a:solidFill>
               <a:latin typeface="Roboto" panose="02000000000000000000" pitchFamily="2" charset="0"/>
               <a:ea typeface="Roboto" panose="02000000000000000000" pitchFamily="2" charset="0"/>
-            </a:endParaRPr>
-          </a:p>
-        </p:txBody>
-      </p:sp>
-      <p:sp>
-        <p:nvSpPr>
-          <p:cNvPr id="2" name="TextBox 1">
-            <a:extLst>
-              <a:ext uri="{FF2B5EF4-FFF2-40B4-BE49-F238E27FC236}">
-                <a16:creationId xmlns:a16="http://schemas.microsoft.com/office/drawing/2014/main" id="{3BB011FA-2DB8-A449-BC6D-68EA56CC8B46}"/>
-              </a:ext>
-            </a:extLst>
-          </p:cNvPr>
-          <p:cNvSpPr txBox="1"/>
-          <p:nvPr/>
-        </p:nvSpPr>
-        <p:spPr>
-          <a:xfrm>
-            <a:off x="1714501" y="3457833"/>
-            <a:ext cx="4174669" cy="769441"/>
-          </a:xfrm>
-          <a:prstGeom prst="rect">
-            <a:avLst/>
-          </a:prstGeom>
-          <a:noFill/>
-        </p:spPr>
-        <p:txBody>
-          <a:bodyPr wrap="none" rtlCol="0">
-            <a:spAutoFit/>
-          </a:bodyPr>
-          <a:lstStyle/>
-          <a:p>
-            <a:r>
-              <a:rPr lang="es-ES_tradnl" sz="4400" dirty="0">
-                <a:solidFill>
-                  <a:schemeClr val="bg1"/>
-                </a:solidFill>
-              </a:rPr>
-              <a:t>Gráficos </a:t>
-            </a:r>
-            <a:r>
-              <a:rPr lang="es-ES_tradnl" sz="4400" dirty="0" err="1">
-                <a:solidFill>
-                  <a:schemeClr val="bg1"/>
-                </a:solidFill>
-              </a:rPr>
-              <a:t>pulentos</a:t>
-            </a:r>
-            <a:endParaRPr lang="es-ES_tradnl" sz="4400" dirty="0">
-              <a:solidFill>
-                <a:schemeClr val="bg1"/>
-              </a:solidFill>
             </a:endParaRPr>
           </a:p>
         </p:txBody>
@@ -6594,10 +7336,129 @@
           </p:txBody>
         </p:sp>
       </p:grpSp>
+      <p:sp>
+        <p:nvSpPr>
+          <p:cNvPr id="3" name="Rectangle 2">
+            <a:extLst>
+              <a:ext uri="{FF2B5EF4-FFF2-40B4-BE49-F238E27FC236}">
+                <a16:creationId xmlns:a16="http://schemas.microsoft.com/office/drawing/2014/main" id="{EDDA3E45-A7DB-2841-96FB-8A05943D2918}"/>
+              </a:ext>
+            </a:extLst>
+          </p:cNvPr>
+          <p:cNvSpPr/>
+          <p:nvPr/>
+        </p:nvSpPr>
+        <p:spPr>
+          <a:xfrm>
+            <a:off x="2042160" y="1871826"/>
+            <a:ext cx="8107680" cy="3114347"/>
+          </a:xfrm>
+          <a:prstGeom prst="rect">
+            <a:avLst/>
+          </a:prstGeom>
+        </p:spPr>
+        <p:style>
+          <a:lnRef idx="2">
+            <a:schemeClr val="accent1">
+              <a:shade val="50000"/>
+            </a:schemeClr>
+          </a:lnRef>
+          <a:fillRef idx="1">
+            <a:schemeClr val="accent1"/>
+          </a:fillRef>
+          <a:effectRef idx="0">
+            <a:schemeClr val="accent1"/>
+          </a:effectRef>
+          <a:fontRef idx="minor">
+            <a:schemeClr val="lt1"/>
+          </a:fontRef>
+        </p:style>
+        <p:txBody>
+          <a:bodyPr rtlCol="0" anchor="ctr"/>
+          <a:lstStyle/>
+          <a:p>
+            <a:pPr algn="ctr"/>
+            <a:r>
+              <a:rPr lang="es-ES_tradnl" dirty="0" err="1"/>
+              <a:t>Graficos</a:t>
+            </a:r>
+            <a:r>
+              <a:rPr lang="es-ES_tradnl" dirty="0"/>
+              <a:t> </a:t>
+            </a:r>
+            <a:r>
+              <a:rPr lang="es-ES_tradnl" dirty="0" err="1"/>
+              <a:t>pulentos</a:t>
+            </a:r>
+            <a:endParaRPr lang="es-ES_tradnl" dirty="0"/>
+          </a:p>
+        </p:txBody>
+      </p:sp>
+      <p:sp>
+        <p:nvSpPr>
+          <p:cNvPr id="15" name="Rectangle 14">
+            <a:extLst>
+              <a:ext uri="{FF2B5EF4-FFF2-40B4-BE49-F238E27FC236}">
+                <a16:creationId xmlns:a16="http://schemas.microsoft.com/office/drawing/2014/main" id="{297EF101-6CF1-914D-8C1A-F8ABB8F01D3B}"/>
+              </a:ext>
+            </a:extLst>
+          </p:cNvPr>
+          <p:cNvSpPr/>
+          <p:nvPr/>
+        </p:nvSpPr>
+        <p:spPr>
+          <a:xfrm>
+            <a:off x="5126156" y="5824961"/>
+            <a:ext cx="1939687" cy="651236"/>
+          </a:xfrm>
+          <a:prstGeom prst="rect">
+            <a:avLst/>
+          </a:prstGeom>
+          <a:solidFill>
+            <a:srgbClr val="785D9E"/>
+          </a:solidFill>
+          <a:ln w="127000" cap="rnd">
+            <a:solidFill>
+              <a:srgbClr val="785D9E"/>
+            </a:solidFill>
+            <a:round/>
+          </a:ln>
+        </p:spPr>
+        <p:style>
+          <a:lnRef idx="2">
+            <a:schemeClr val="accent1">
+              <a:shade val="50000"/>
+            </a:schemeClr>
+          </a:lnRef>
+          <a:fillRef idx="1">
+            <a:schemeClr val="accent1"/>
+          </a:fillRef>
+          <a:effectRef idx="0">
+            <a:schemeClr val="accent1"/>
+          </a:effectRef>
+          <a:fontRef idx="minor">
+            <a:schemeClr val="lt1"/>
+          </a:fontRef>
+        </p:style>
+        <p:txBody>
+          <a:bodyPr rtlCol="0" anchor="ctr"/>
+          <a:lstStyle/>
+          <a:p>
+            <a:pPr algn="ctr"/>
+            <a:r>
+              <a:rPr lang="es-ES_tradnl" sz="2400" b="1" dirty="0">
+                <a:latin typeface="Roboto" panose="02000000000000000000" pitchFamily="2" charset="0"/>
+                <a:ea typeface="Roboto" panose="02000000000000000000" pitchFamily="2" charset="0"/>
+              </a:rPr>
+              <a:t>Ver más</a:t>
+            </a:r>
+          </a:p>
+        </p:txBody>
+      </p:sp>
     </p:spTree>
     <p:extLst>
       <p:ext uri="{BB962C8B-B14F-4D97-AF65-F5344CB8AC3E}">
-        <p14:creationId xmlns:p14="http://schemas.microsoft.com/office/powerpoint/2010/main" val="436031422"/>
+        <p14:creationId xmlns:p14="http://schemas.microsoft.com/office/powerpoint/2010/main" val="4028775113"/>
       </p:ext>
     </p:extLst>
   </p:cSld>
@@ -6610,7 +7471,659 @@
 </p:sld>
 </file>
 
-<file path=ppt/slides/slide15.xml><?xml version="1.0" encoding="utf-8"?>
+<file path=ppt/slides/slide16.xml><?xml version="1.0" encoding="utf-8"?>
+<p:sld xmlns:a="http://schemas.openxmlformats.org/drawingml/2006/main" xmlns:r="http://schemas.openxmlformats.org/officeDocument/2006/relationships" xmlns:p="http://schemas.openxmlformats.org/presentationml/2006/main">
+  <p:cSld>
+    <p:bg>
+      <p:bgPr>
+        <a:solidFill>
+          <a:srgbClr val="6B4377"/>
+        </a:solidFill>
+        <a:effectLst/>
+      </p:bgPr>
+    </p:bg>
+    <p:spTree>
+      <p:nvGrpSpPr>
+        <p:cNvPr id="1" name=""/>
+        <p:cNvGrpSpPr/>
+        <p:nvPr/>
+      </p:nvGrpSpPr>
+      <p:grpSpPr>
+        <a:xfrm>
+          <a:off x="0" y="0"/>
+          <a:ext cx="0" cy="0"/>
+          <a:chOff x="0" y="0"/>
+          <a:chExt cx="0" cy="0"/>
+        </a:xfrm>
+      </p:grpSpPr>
+      <p:grpSp>
+        <p:nvGrpSpPr>
+          <p:cNvPr id="8" name="Group 7">
+            <a:extLst>
+              <a:ext uri="{FF2B5EF4-FFF2-40B4-BE49-F238E27FC236}">
+                <a16:creationId xmlns:a16="http://schemas.microsoft.com/office/drawing/2014/main" id="{23E1AAA3-9611-744B-8165-BA4EE5F6FAF9}"/>
+              </a:ext>
+            </a:extLst>
+          </p:cNvPr>
+          <p:cNvGrpSpPr/>
+          <p:nvPr/>
+        </p:nvGrpSpPr>
+        <p:grpSpPr>
+          <a:xfrm>
+            <a:off x="11595394" y="2278155"/>
+            <a:ext cx="296562" cy="2330266"/>
+            <a:chOff x="11310096" y="2644346"/>
+            <a:chExt cx="296562" cy="2330266"/>
+          </a:xfrm>
+        </p:grpSpPr>
+        <p:sp>
+          <p:nvSpPr>
+            <p:cNvPr id="9" name="Oval 8">
+              <a:extLst>
+                <a:ext uri="{FF2B5EF4-FFF2-40B4-BE49-F238E27FC236}">
+                  <a16:creationId xmlns:a16="http://schemas.microsoft.com/office/drawing/2014/main" id="{ED93E88C-89B9-104C-A6F5-B4DB868D3EE3}"/>
+                </a:ext>
+              </a:extLst>
+            </p:cNvPr>
+            <p:cNvSpPr/>
+            <p:nvPr/>
+          </p:nvSpPr>
+          <p:spPr>
+            <a:xfrm>
+              <a:off x="11310096" y="2644346"/>
+              <a:ext cx="296562" cy="296562"/>
+            </a:xfrm>
+            <a:prstGeom prst="ellipse">
+              <a:avLst/>
+            </a:prstGeom>
+            <a:noFill/>
+            <a:ln w="63500">
+              <a:solidFill>
+                <a:schemeClr val="bg1"/>
+              </a:solidFill>
+            </a:ln>
+          </p:spPr>
+          <p:style>
+            <a:lnRef idx="2">
+              <a:schemeClr val="accent1">
+                <a:shade val="50000"/>
+              </a:schemeClr>
+            </a:lnRef>
+            <a:fillRef idx="1">
+              <a:schemeClr val="accent1"/>
+            </a:fillRef>
+            <a:effectRef idx="0">
+              <a:schemeClr val="accent1"/>
+            </a:effectRef>
+            <a:fontRef idx="minor">
+              <a:schemeClr val="lt1"/>
+            </a:fontRef>
+          </p:style>
+          <p:txBody>
+            <a:bodyPr rtlCol="0" anchor="ctr"/>
+            <a:lstStyle/>
+            <a:p>
+              <a:pPr algn="ctr"/>
+              <a:endParaRPr lang="es-ES_tradnl"/>
+            </a:p>
+          </p:txBody>
+        </p:sp>
+        <p:sp>
+          <p:nvSpPr>
+            <p:cNvPr id="10" name="Oval 9">
+              <a:extLst>
+                <a:ext uri="{FF2B5EF4-FFF2-40B4-BE49-F238E27FC236}">
+                  <a16:creationId xmlns:a16="http://schemas.microsoft.com/office/drawing/2014/main" id="{1898CB3D-C375-CB44-9D77-23EC73B8336D}"/>
+                </a:ext>
+              </a:extLst>
+            </p:cNvPr>
+            <p:cNvSpPr/>
+            <p:nvPr/>
+          </p:nvSpPr>
+          <p:spPr>
+            <a:xfrm>
+              <a:off x="11310096" y="3152772"/>
+              <a:ext cx="296562" cy="296562"/>
+            </a:xfrm>
+            <a:prstGeom prst="ellipse">
+              <a:avLst/>
+            </a:prstGeom>
+            <a:noFill/>
+            <a:ln w="63500">
+              <a:solidFill>
+                <a:schemeClr val="bg1"/>
+              </a:solidFill>
+            </a:ln>
+          </p:spPr>
+          <p:style>
+            <a:lnRef idx="2">
+              <a:schemeClr val="accent1">
+                <a:shade val="50000"/>
+              </a:schemeClr>
+            </a:lnRef>
+            <a:fillRef idx="1">
+              <a:schemeClr val="accent1"/>
+            </a:fillRef>
+            <a:effectRef idx="0">
+              <a:schemeClr val="accent1"/>
+            </a:effectRef>
+            <a:fontRef idx="minor">
+              <a:schemeClr val="lt1"/>
+            </a:fontRef>
+          </p:style>
+          <p:txBody>
+            <a:bodyPr rtlCol="0" anchor="ctr"/>
+            <a:lstStyle/>
+            <a:p>
+              <a:pPr algn="ctr"/>
+              <a:endParaRPr lang="es-ES_tradnl"/>
+            </a:p>
+          </p:txBody>
+        </p:sp>
+        <p:sp>
+          <p:nvSpPr>
+            <p:cNvPr id="12" name="Oval 11">
+              <a:extLst>
+                <a:ext uri="{FF2B5EF4-FFF2-40B4-BE49-F238E27FC236}">
+                  <a16:creationId xmlns:a16="http://schemas.microsoft.com/office/drawing/2014/main" id="{09D2BB50-51B5-3C45-8ECD-77EB390E90D2}"/>
+                </a:ext>
+              </a:extLst>
+            </p:cNvPr>
+            <p:cNvSpPr/>
+            <p:nvPr/>
+          </p:nvSpPr>
+          <p:spPr>
+            <a:xfrm>
+              <a:off x="11310096" y="3661198"/>
+              <a:ext cx="296562" cy="296562"/>
+            </a:xfrm>
+            <a:prstGeom prst="ellipse">
+              <a:avLst/>
+            </a:prstGeom>
+            <a:noFill/>
+            <a:ln w="63500">
+              <a:solidFill>
+                <a:schemeClr val="bg1"/>
+              </a:solidFill>
+            </a:ln>
+          </p:spPr>
+          <p:style>
+            <a:lnRef idx="2">
+              <a:schemeClr val="accent1">
+                <a:shade val="50000"/>
+              </a:schemeClr>
+            </a:lnRef>
+            <a:fillRef idx="1">
+              <a:schemeClr val="accent1"/>
+            </a:fillRef>
+            <a:effectRef idx="0">
+              <a:schemeClr val="accent1"/>
+            </a:effectRef>
+            <a:fontRef idx="minor">
+              <a:schemeClr val="lt1"/>
+            </a:fontRef>
+          </p:style>
+          <p:txBody>
+            <a:bodyPr rtlCol="0" anchor="ctr"/>
+            <a:lstStyle/>
+            <a:p>
+              <a:pPr algn="ctr"/>
+              <a:endParaRPr lang="es-ES_tradnl"/>
+            </a:p>
+          </p:txBody>
+        </p:sp>
+        <p:sp>
+          <p:nvSpPr>
+            <p:cNvPr id="13" name="Oval 12">
+              <a:extLst>
+                <a:ext uri="{FF2B5EF4-FFF2-40B4-BE49-F238E27FC236}">
+                  <a16:creationId xmlns:a16="http://schemas.microsoft.com/office/drawing/2014/main" id="{376B9D10-0A9F-2D42-8CCA-337A568EC021}"/>
+                </a:ext>
+              </a:extLst>
+            </p:cNvPr>
+            <p:cNvSpPr/>
+            <p:nvPr/>
+          </p:nvSpPr>
+          <p:spPr>
+            <a:xfrm>
+              <a:off x="11310096" y="4169624"/>
+              <a:ext cx="296562" cy="296562"/>
+            </a:xfrm>
+            <a:prstGeom prst="ellipse">
+              <a:avLst/>
+            </a:prstGeom>
+            <a:solidFill>
+              <a:schemeClr val="bg1"/>
+            </a:solidFill>
+            <a:ln w="63500">
+              <a:solidFill>
+                <a:schemeClr val="bg1"/>
+              </a:solidFill>
+            </a:ln>
+          </p:spPr>
+          <p:style>
+            <a:lnRef idx="2">
+              <a:schemeClr val="accent1">
+                <a:shade val="50000"/>
+              </a:schemeClr>
+            </a:lnRef>
+            <a:fillRef idx="1">
+              <a:schemeClr val="accent1"/>
+            </a:fillRef>
+            <a:effectRef idx="0">
+              <a:schemeClr val="accent1"/>
+            </a:effectRef>
+            <a:fontRef idx="minor">
+              <a:schemeClr val="lt1"/>
+            </a:fontRef>
+          </p:style>
+          <p:txBody>
+            <a:bodyPr rtlCol="0" anchor="ctr"/>
+            <a:lstStyle/>
+            <a:p>
+              <a:pPr algn="ctr"/>
+              <a:endParaRPr lang="es-ES_tradnl"/>
+            </a:p>
+          </p:txBody>
+        </p:sp>
+        <p:sp>
+          <p:nvSpPr>
+            <p:cNvPr id="14" name="Oval 13">
+              <a:extLst>
+                <a:ext uri="{FF2B5EF4-FFF2-40B4-BE49-F238E27FC236}">
+                  <a16:creationId xmlns:a16="http://schemas.microsoft.com/office/drawing/2014/main" id="{552A2E91-B6C2-AC4E-8A55-7E1E2E65F43A}"/>
+                </a:ext>
+              </a:extLst>
+            </p:cNvPr>
+            <p:cNvSpPr/>
+            <p:nvPr/>
+          </p:nvSpPr>
+          <p:spPr>
+            <a:xfrm>
+              <a:off x="11310096" y="4678050"/>
+              <a:ext cx="296562" cy="296562"/>
+            </a:xfrm>
+            <a:prstGeom prst="ellipse">
+              <a:avLst/>
+            </a:prstGeom>
+            <a:noFill/>
+            <a:ln w="63500">
+              <a:solidFill>
+                <a:schemeClr val="bg1"/>
+              </a:solidFill>
+            </a:ln>
+          </p:spPr>
+          <p:style>
+            <a:lnRef idx="2">
+              <a:schemeClr val="accent1">
+                <a:shade val="50000"/>
+              </a:schemeClr>
+            </a:lnRef>
+            <a:fillRef idx="1">
+              <a:schemeClr val="accent1"/>
+            </a:fillRef>
+            <a:effectRef idx="0">
+              <a:schemeClr val="accent1"/>
+            </a:effectRef>
+            <a:fontRef idx="minor">
+              <a:schemeClr val="lt1"/>
+            </a:fontRef>
+          </p:style>
+          <p:txBody>
+            <a:bodyPr rtlCol="0" anchor="ctr"/>
+            <a:lstStyle/>
+            <a:p>
+              <a:pPr algn="ctr"/>
+              <a:endParaRPr lang="es-ES_tradnl"/>
+            </a:p>
+          </p:txBody>
+        </p:sp>
+      </p:grpSp>
+      <p:sp>
+        <p:nvSpPr>
+          <p:cNvPr id="15" name="TextBox 14">
+            <a:extLst>
+              <a:ext uri="{FF2B5EF4-FFF2-40B4-BE49-F238E27FC236}">
+                <a16:creationId xmlns:a16="http://schemas.microsoft.com/office/drawing/2014/main" id="{94B16EE8-12F2-B44D-9900-DA2B022841CB}"/>
+              </a:ext>
+            </a:extLst>
+          </p:cNvPr>
+          <p:cNvSpPr txBox="1"/>
+          <p:nvPr/>
+        </p:nvSpPr>
+        <p:spPr>
+          <a:xfrm>
+            <a:off x="2865884" y="1463007"/>
+            <a:ext cx="6460230" cy="477054"/>
+          </a:xfrm>
+          <a:prstGeom prst="rect">
+            <a:avLst/>
+          </a:prstGeom>
+          <a:noFill/>
+        </p:spPr>
+        <p:txBody>
+          <a:bodyPr wrap="square" rtlCol="0">
+            <a:spAutoFit/>
+          </a:bodyPr>
+          <a:lstStyle/>
+          <a:p>
+            <a:pPr algn="ctr"/>
+            <a:r>
+              <a:rPr lang="es-ES_tradnl" sz="2500" b="1" dirty="0">
+                <a:solidFill>
+                  <a:schemeClr val="bg1"/>
+                </a:solidFill>
+                <a:latin typeface="Roboto" panose="02000000000000000000" pitchFamily="2" charset="0"/>
+                <a:ea typeface="Roboto" panose="02000000000000000000" pitchFamily="2" charset="0"/>
+              </a:rPr>
+              <a:t>Con la versión completa podrás:</a:t>
+            </a:r>
+            <a:endParaRPr lang="es-ES_tradnl" sz="2400" dirty="0">
+              <a:solidFill>
+                <a:schemeClr val="bg1"/>
+              </a:solidFill>
+              <a:latin typeface="Roboto" panose="02000000000000000000" pitchFamily="2" charset="0"/>
+              <a:ea typeface="Roboto" panose="02000000000000000000" pitchFamily="2" charset="0"/>
+            </a:endParaRPr>
+          </a:p>
+        </p:txBody>
+      </p:sp>
+      <p:sp>
+        <p:nvSpPr>
+          <p:cNvPr id="17" name="Rectangle 16">
+            <a:extLst>
+              <a:ext uri="{FF2B5EF4-FFF2-40B4-BE49-F238E27FC236}">
+                <a16:creationId xmlns:a16="http://schemas.microsoft.com/office/drawing/2014/main" id="{150C2A8F-C66D-DE4C-B3A6-CD8130036CF8}"/>
+              </a:ext>
+            </a:extLst>
+          </p:cNvPr>
+          <p:cNvSpPr/>
+          <p:nvPr/>
+        </p:nvSpPr>
+        <p:spPr>
+          <a:xfrm>
+            <a:off x="5126156" y="5824961"/>
+            <a:ext cx="1939687" cy="651236"/>
+          </a:xfrm>
+          <a:prstGeom prst="rect">
+            <a:avLst/>
+          </a:prstGeom>
+          <a:solidFill>
+            <a:srgbClr val="785D9E"/>
+          </a:solidFill>
+          <a:ln w="127000" cap="rnd">
+            <a:solidFill>
+              <a:srgbClr val="785D9E"/>
+            </a:solidFill>
+            <a:round/>
+          </a:ln>
+        </p:spPr>
+        <p:style>
+          <a:lnRef idx="2">
+            <a:schemeClr val="accent1">
+              <a:shade val="50000"/>
+            </a:schemeClr>
+          </a:lnRef>
+          <a:fillRef idx="1">
+            <a:schemeClr val="accent1"/>
+          </a:fillRef>
+          <a:effectRef idx="0">
+            <a:schemeClr val="accent1"/>
+          </a:effectRef>
+          <a:fontRef idx="minor">
+            <a:schemeClr val="lt1"/>
+          </a:fontRef>
+        </p:style>
+        <p:txBody>
+          <a:bodyPr rtlCol="0" anchor="ctr"/>
+          <a:lstStyle/>
+          <a:p>
+            <a:pPr algn="ctr"/>
+            <a:r>
+              <a:rPr lang="es-ES_tradnl" sz="2400" b="1" dirty="0">
+                <a:latin typeface="Roboto" panose="02000000000000000000" pitchFamily="2" charset="0"/>
+                <a:ea typeface="Roboto" panose="02000000000000000000" pitchFamily="2" charset="0"/>
+              </a:rPr>
+              <a:t>Contáctanos</a:t>
+            </a:r>
+          </a:p>
+        </p:txBody>
+      </p:sp>
+      <p:sp>
+        <p:nvSpPr>
+          <p:cNvPr id="3" name="Rectangle 2">
+            <a:extLst>
+              <a:ext uri="{FF2B5EF4-FFF2-40B4-BE49-F238E27FC236}">
+                <a16:creationId xmlns:a16="http://schemas.microsoft.com/office/drawing/2014/main" id="{FAA9858B-D1A4-3A49-BE3D-229B6292F0D6}"/>
+              </a:ext>
+            </a:extLst>
+          </p:cNvPr>
+          <p:cNvSpPr/>
+          <p:nvPr/>
+        </p:nvSpPr>
+        <p:spPr>
+          <a:xfrm>
+            <a:off x="1103772" y="2072681"/>
+            <a:ext cx="9941414" cy="892552"/>
+          </a:xfrm>
+          <a:prstGeom prst="rect">
+            <a:avLst/>
+          </a:prstGeom>
+        </p:spPr>
+        <p:txBody>
+          <a:bodyPr wrap="square">
+            <a:spAutoFit/>
+          </a:bodyPr>
+          <a:lstStyle/>
+          <a:p>
+            <a:pPr lvl="0"/>
+            <a:r>
+              <a:rPr lang="es-ES_tradnl" sz="3000" b="1" dirty="0">
+                <a:solidFill>
+                  <a:prstClr val="white"/>
+                </a:solidFill>
+                <a:latin typeface="Roboto" panose="02000000000000000000" pitchFamily="2" charset="0"/>
+                <a:ea typeface="Roboto" panose="02000000000000000000" pitchFamily="2" charset="0"/>
+              </a:rPr>
+              <a:t>+ Escala</a:t>
+            </a:r>
+          </a:p>
+          <a:p>
+            <a:pPr lvl="0"/>
+            <a:r>
+              <a:rPr lang="es-ES_tradnl" sz="2200" dirty="0">
+                <a:solidFill>
+                  <a:prstClr val="white"/>
+                </a:solidFill>
+                <a:latin typeface="Roboto" panose="02000000000000000000" pitchFamily="2" charset="0"/>
+                <a:ea typeface="Roboto" panose="02000000000000000000" pitchFamily="2" charset="0"/>
+              </a:rPr>
+              <a:t>Analiza locales completos y pools de cajas (por ejemplo, cajas autoservicio).</a:t>
+            </a:r>
+            <a:endParaRPr lang="es-ES_tradnl" sz="2200" b="1" dirty="0">
+              <a:solidFill>
+                <a:prstClr val="white"/>
+              </a:solidFill>
+              <a:latin typeface="Roboto" panose="02000000000000000000" pitchFamily="2" charset="0"/>
+              <a:ea typeface="Roboto" panose="02000000000000000000" pitchFamily="2" charset="0"/>
+            </a:endParaRPr>
+          </a:p>
+        </p:txBody>
+      </p:sp>
+      <p:sp>
+        <p:nvSpPr>
+          <p:cNvPr id="4" name="Rectangle 3">
+            <a:extLst>
+              <a:ext uri="{FF2B5EF4-FFF2-40B4-BE49-F238E27FC236}">
+                <a16:creationId xmlns:a16="http://schemas.microsoft.com/office/drawing/2014/main" id="{E6E65D7B-EDFF-FE42-9CF4-5888A80F72B4}"/>
+              </a:ext>
+            </a:extLst>
+          </p:cNvPr>
+          <p:cNvSpPr/>
+          <p:nvPr/>
+        </p:nvSpPr>
+        <p:spPr>
+          <a:xfrm>
+            <a:off x="1103772" y="3065252"/>
+            <a:ext cx="9570720" cy="892552"/>
+          </a:xfrm>
+          <a:prstGeom prst="rect">
+            <a:avLst/>
+          </a:prstGeom>
+        </p:spPr>
+        <p:txBody>
+          <a:bodyPr wrap="square">
+            <a:spAutoFit/>
+          </a:bodyPr>
+          <a:lstStyle/>
+          <a:p>
+            <a:pPr lvl="0"/>
+            <a:r>
+              <a:rPr lang="es-ES_tradnl" sz="3000" b="1" dirty="0">
+                <a:solidFill>
+                  <a:prstClr val="white"/>
+                </a:solidFill>
+                <a:latin typeface="Roboto" panose="02000000000000000000" pitchFamily="2" charset="0"/>
+                <a:ea typeface="Roboto" panose="02000000000000000000" pitchFamily="2" charset="0"/>
+              </a:rPr>
+              <a:t>+ Horizonte</a:t>
+            </a:r>
+          </a:p>
+          <a:p>
+            <a:pPr lvl="0"/>
+            <a:r>
+              <a:rPr lang="es-ES_tradnl" sz="2200" dirty="0">
+                <a:solidFill>
+                  <a:prstClr val="white"/>
+                </a:solidFill>
+                <a:latin typeface="Roboto" panose="02000000000000000000" pitchFamily="2" charset="0"/>
+                <a:ea typeface="Roboto" panose="02000000000000000000" pitchFamily="2" charset="0"/>
+              </a:rPr>
+              <a:t>Analiza semanas, meses y años completos.</a:t>
+            </a:r>
+          </a:p>
+        </p:txBody>
+      </p:sp>
+      <p:sp>
+        <p:nvSpPr>
+          <p:cNvPr id="5" name="Rectangle 4">
+            <a:extLst>
+              <a:ext uri="{FF2B5EF4-FFF2-40B4-BE49-F238E27FC236}">
+                <a16:creationId xmlns:a16="http://schemas.microsoft.com/office/drawing/2014/main" id="{EEA77F8E-FECD-304A-9A5D-463F7D4B9F1D}"/>
+              </a:ext>
+            </a:extLst>
+          </p:cNvPr>
+          <p:cNvSpPr/>
+          <p:nvPr/>
+        </p:nvSpPr>
+        <p:spPr>
+          <a:xfrm>
+            <a:off x="1103772" y="3975943"/>
+            <a:ext cx="9704806" cy="892552"/>
+          </a:xfrm>
+          <a:prstGeom prst="rect">
+            <a:avLst/>
+          </a:prstGeom>
+        </p:spPr>
+        <p:txBody>
+          <a:bodyPr wrap="square">
+            <a:spAutoFit/>
+          </a:bodyPr>
+          <a:lstStyle/>
+          <a:p>
+            <a:pPr lvl="0"/>
+            <a:r>
+              <a:rPr lang="es-ES_tradnl" sz="3000" b="1" dirty="0">
+                <a:solidFill>
+                  <a:prstClr val="white"/>
+                </a:solidFill>
+                <a:latin typeface="Roboto" panose="02000000000000000000" pitchFamily="2" charset="0"/>
+                <a:ea typeface="Roboto" panose="02000000000000000000" pitchFamily="2" charset="0"/>
+              </a:rPr>
+              <a:t>+ Inmediatez</a:t>
+            </a:r>
+          </a:p>
+          <a:p>
+            <a:pPr lvl="0"/>
+            <a:r>
+              <a:rPr lang="es-ES_tradnl" sz="2200" dirty="0">
+                <a:solidFill>
+                  <a:prstClr val="white"/>
+                </a:solidFill>
+                <a:latin typeface="Roboto" panose="02000000000000000000" pitchFamily="2" charset="0"/>
+                <a:ea typeface="Roboto" panose="02000000000000000000" pitchFamily="2" charset="0"/>
+              </a:rPr>
+              <a:t>Conoce el estado de las colas de tus locales en tiempo real</a:t>
+            </a:r>
+          </a:p>
+        </p:txBody>
+      </p:sp>
+      <p:sp>
+        <p:nvSpPr>
+          <p:cNvPr id="18" name="TextBox 17">
+            <a:extLst>
+              <a:ext uri="{FF2B5EF4-FFF2-40B4-BE49-F238E27FC236}">
+                <a16:creationId xmlns:a16="http://schemas.microsoft.com/office/drawing/2014/main" id="{F6180F72-A993-F74D-A629-F3EE30CADB7E}"/>
+              </a:ext>
+            </a:extLst>
+          </p:cNvPr>
+          <p:cNvSpPr txBox="1"/>
+          <p:nvPr/>
+        </p:nvSpPr>
+        <p:spPr>
+          <a:xfrm>
+            <a:off x="506628" y="347325"/>
+            <a:ext cx="11108724" cy="1015663"/>
+          </a:xfrm>
+          <a:prstGeom prst="rect">
+            <a:avLst/>
+          </a:prstGeom>
+          <a:noFill/>
+        </p:spPr>
+        <p:txBody>
+          <a:bodyPr wrap="square" rtlCol="0">
+            <a:spAutoFit/>
+          </a:bodyPr>
+          <a:lstStyle/>
+          <a:p>
+            <a:pPr algn="ctr"/>
+            <a:r>
+              <a:rPr lang="es-ES_tradnl" sz="6000" dirty="0">
+                <a:solidFill>
+                  <a:schemeClr val="bg1"/>
+                </a:solidFill>
+                <a:latin typeface="Roboto" panose="02000000000000000000" pitchFamily="2" charset="0"/>
+                <a:ea typeface="Roboto" panose="02000000000000000000" pitchFamily="2" charset="0"/>
+              </a:rPr>
+              <a:t>pruébame</a:t>
+            </a:r>
+            <a:endParaRPr lang="es-ES_tradnl" sz="6000" b="1" dirty="0">
+              <a:solidFill>
+                <a:schemeClr val="bg1"/>
+              </a:solidFill>
+              <a:latin typeface="Roboto" panose="02000000000000000000" pitchFamily="2" charset="0"/>
+              <a:ea typeface="Roboto" panose="02000000000000000000" pitchFamily="2" charset="0"/>
+            </a:endParaRPr>
+          </a:p>
+        </p:txBody>
+      </p:sp>
+    </p:spTree>
+    <p:extLst>
+      <p:ext uri="{BB962C8B-B14F-4D97-AF65-F5344CB8AC3E}">
+        <p14:creationId xmlns:p14="http://schemas.microsoft.com/office/powerpoint/2010/main" val="564124958"/>
+      </p:ext>
+    </p:extLst>
+  </p:cSld>
+  <p:clrMapOvr>
+    <a:masterClrMapping/>
+  </p:clrMapOvr>
+  <p:transition spd="slow">
+    <p:push dir="u"/>
+  </p:transition>
+</p:sld>
+</file>
+
+<file path=ppt/slides/slide17.xml><?xml version="1.0" encoding="utf-8"?>
 <p:sld xmlns:a="http://schemas.openxmlformats.org/drawingml/2006/main" xmlns:r="http://schemas.openxmlformats.org/officeDocument/2006/relationships" xmlns:p="http://schemas.openxmlformats.org/presentationml/2006/main">
   <p:cSld>
     <p:bg>

</xml_diff>